<commit_message>
Refactoring and update presentation
</commit_message>
<xml_diff>
--- a/Cosmos DB for C# developers.pptx
+++ b/Cosmos DB for C# developers.pptx
@@ -145,6 +145,7 @@
     <p1510:client id="{1920ABBF-50F9-49FB-9678-9FCD924D490F}" v="37" dt="2022-03-25T19:23:18.466"/>
     <p1510:client id="{3068E453-B052-4D6F-9E39-1C46E62C0E6D}" v="2055" dt="2022-02-24T22:54:38.840"/>
     <p1510:client id="{31792FE7-1FD2-4EED-8148-1BCE3AC3737E}" v="44" dt="2022-03-27T20:32:09.041"/>
+    <p1510:client id="{38BBD285-B5F2-43B6-A1CE-3027A7CDF8C5}" v="78" dt="2022-03-29T07:14:16.715"/>
     <p1510:client id="{3FF5C8CB-CCD1-4753-9E84-23E5A280435A}" v="6" dt="2022-03-27T13:21:12.129"/>
     <p1510:client id="{7C6BD868-296D-481F-A82A-D49E04B41DB1}" v="319" dt="2022-03-24T19:31:02.249"/>
     <p1510:client id="{8BB7848C-4022-4656-A5FC-F1EC1ABD5AD5}" v="28" dt="2022-03-25T21:12:09.064"/>
@@ -286,7 +287,7 @@
           <a:p>
             <a:fld id="{846CE7D5-CF57-46EF-B807-FDD0502418D4}" type="datetimeFigureOut">
               <a:rPr lang="en-US" smtClean="0"/>
-              <a:t>3/27/2022</a:t>
+              <a:t>3/29/2022</a:t>
             </a:fld>
             <a:endParaRPr lang="en-US"/>
           </a:p>
@@ -456,7 +457,7 @@
           <a:p>
             <a:fld id="{846CE7D5-CF57-46EF-B807-FDD0502418D4}" type="datetimeFigureOut">
               <a:rPr lang="en-US" smtClean="0"/>
-              <a:t>3/27/2022</a:t>
+              <a:t>3/29/2022</a:t>
             </a:fld>
             <a:endParaRPr lang="en-US"/>
           </a:p>
@@ -636,7 +637,7 @@
           <a:p>
             <a:fld id="{846CE7D5-CF57-46EF-B807-FDD0502418D4}" type="datetimeFigureOut">
               <a:rPr lang="en-US" smtClean="0"/>
-              <a:t>3/27/2022</a:t>
+              <a:t>3/29/2022</a:t>
             </a:fld>
             <a:endParaRPr lang="en-US"/>
           </a:p>
@@ -806,7 +807,7 @@
           <a:p>
             <a:fld id="{846CE7D5-CF57-46EF-B807-FDD0502418D4}" type="datetimeFigureOut">
               <a:rPr lang="en-US" smtClean="0"/>
-              <a:t>3/27/2022</a:t>
+              <a:t>3/29/2022</a:t>
             </a:fld>
             <a:endParaRPr lang="en-US"/>
           </a:p>
@@ -1052,7 +1053,7 @@
           <a:p>
             <a:fld id="{846CE7D5-CF57-46EF-B807-FDD0502418D4}" type="datetimeFigureOut">
               <a:rPr lang="en-US" smtClean="0"/>
-              <a:t>3/27/2022</a:t>
+              <a:t>3/29/2022</a:t>
             </a:fld>
             <a:endParaRPr lang="en-US"/>
           </a:p>
@@ -1284,7 +1285,7 @@
           <a:p>
             <a:fld id="{846CE7D5-CF57-46EF-B807-FDD0502418D4}" type="datetimeFigureOut">
               <a:rPr lang="en-US" smtClean="0"/>
-              <a:t>3/27/2022</a:t>
+              <a:t>3/29/2022</a:t>
             </a:fld>
             <a:endParaRPr lang="en-US"/>
           </a:p>
@@ -1651,7 +1652,7 @@
           <a:p>
             <a:fld id="{846CE7D5-CF57-46EF-B807-FDD0502418D4}" type="datetimeFigureOut">
               <a:rPr lang="en-US" smtClean="0"/>
-              <a:t>3/27/2022</a:t>
+              <a:t>3/29/2022</a:t>
             </a:fld>
             <a:endParaRPr lang="en-US"/>
           </a:p>
@@ -1769,7 +1770,7 @@
           <a:p>
             <a:fld id="{846CE7D5-CF57-46EF-B807-FDD0502418D4}" type="datetimeFigureOut">
               <a:rPr lang="en-US" smtClean="0"/>
-              <a:t>3/27/2022</a:t>
+              <a:t>3/29/2022</a:t>
             </a:fld>
             <a:endParaRPr lang="en-US"/>
           </a:p>
@@ -1864,7 +1865,7 @@
           <a:p>
             <a:fld id="{846CE7D5-CF57-46EF-B807-FDD0502418D4}" type="datetimeFigureOut">
               <a:rPr lang="en-US" smtClean="0"/>
-              <a:t>3/27/2022</a:t>
+              <a:t>3/29/2022</a:t>
             </a:fld>
             <a:endParaRPr lang="en-US"/>
           </a:p>
@@ -2141,7 +2142,7 @@
           <a:p>
             <a:fld id="{846CE7D5-CF57-46EF-B807-FDD0502418D4}" type="datetimeFigureOut">
               <a:rPr lang="en-US" smtClean="0"/>
-              <a:t>3/27/2022</a:t>
+              <a:t>3/29/2022</a:t>
             </a:fld>
             <a:endParaRPr lang="en-US"/>
           </a:p>
@@ -2398,7 +2399,7 @@
           <a:p>
             <a:fld id="{846CE7D5-CF57-46EF-B807-FDD0502418D4}" type="datetimeFigureOut">
               <a:rPr lang="en-US" smtClean="0"/>
-              <a:t>3/27/2022</a:t>
+              <a:t>3/29/2022</a:t>
             </a:fld>
             <a:endParaRPr lang="en-US"/>
           </a:p>
@@ -2618,7 +2619,7 @@
           <a:p>
             <a:fld id="{846CE7D5-CF57-46EF-B807-FDD0502418D4}" type="datetimeFigureOut">
               <a:rPr lang="en-US" smtClean="0"/>
-              <a:t>3/27/2022</a:t>
+              <a:t>3/29/2022</a:t>
             </a:fld>
             <a:endParaRPr lang="en-US"/>
           </a:p>
@@ -3208,6 +3209,25 @@
               </a:rPr>
               <a:t>provisioned(auto scale and manual) - a certain amount of throughput that is provisioned on your databases and containers, the cost of your database operations is calculated from the number of RUs available every second</a:t>
             </a:r>
+            <a:br>
+              <a:rPr lang="en-US" sz="3200" dirty="0">
+                <a:solidFill>
+                  <a:schemeClr val="bg1"/>
+                </a:solidFill>
+                <a:ea typeface="+mn-lt"/>
+                <a:cs typeface="+mn-lt"/>
+              </a:rPr>
+            </a:br>
+            <a:r>
+              <a:rPr lang="en-US" sz="3200" dirty="0">
+                <a:solidFill>
+                  <a:schemeClr val="bg1"/>
+                </a:solidFill>
+                <a:ea typeface="+mn-lt"/>
+                <a:cs typeface="+mn-lt"/>
+              </a:rPr>
+              <a:t>for example  400 RUs/s for 1 hour cost 0.008 USD</a:t>
+            </a:r>
           </a:p>
           <a:p>
             <a:r>

</xml_diff>